<commit_message>
stop. try with free RTOS
</commit_message>
<xml_diff>
--- a/HMI/GUI.pptx
+++ b/HMI/GUI.pptx
@@ -12,7 +12,6 @@
     <p:sldId id="260" r:id="rId6"/>
     <p:sldId id="262" r:id="rId7"/>
     <p:sldId id="263" r:id="rId8"/>
-    <p:sldId id="261" r:id="rId9"/>
   </p:sldIdLst>
   <p:sldSz cx="7620000" cy="4572000"/>
   <p:notesSz cx="6858000" cy="9144000"/>
@@ -13774,94 +13773,506 @@
           </a:p>
         </p:txBody>
       </p:sp>
+      <p:sp>
+        <p:nvSpPr>
+          <p:cNvPr id="19" name="Rectangle 18">
+            <a:extLst>
+              <a:ext uri="{FF2B5EF4-FFF2-40B4-BE49-F238E27FC236}">
+                <a16:creationId xmlns:a16="http://schemas.microsoft.com/office/drawing/2014/main" id="{B4644473-5374-42B7-B1F5-1527AC1D11D9}"/>
+              </a:ext>
+            </a:extLst>
+          </p:cNvPr>
+          <p:cNvSpPr/>
+          <p:nvPr/>
+        </p:nvSpPr>
+        <p:spPr>
+          <a:xfrm>
+            <a:off x="3611853" y="674629"/>
+            <a:ext cx="987515" cy="273738"/>
+          </a:xfrm>
+          <a:prstGeom prst="rect">
+            <a:avLst/>
+          </a:prstGeom>
+          <a:solidFill>
+            <a:schemeClr val="accent6"/>
+          </a:solidFill>
+        </p:spPr>
+        <p:style>
+          <a:lnRef idx="2">
+            <a:schemeClr val="accent4">
+              <a:shade val="50000"/>
+            </a:schemeClr>
+          </a:lnRef>
+          <a:fillRef idx="1">
+            <a:schemeClr val="accent4"/>
+          </a:fillRef>
+          <a:effectRef idx="0">
+            <a:schemeClr val="accent4"/>
+          </a:effectRef>
+          <a:fontRef idx="minor">
+            <a:schemeClr val="lt1"/>
+          </a:fontRef>
+        </p:style>
+        <p:txBody>
+          <a:bodyPr rtlCol="0" anchor="ctr"/>
+          <a:lstStyle/>
+          <a:p>
+            <a:pPr algn="ctr"/>
+            <a:r>
+              <a:rPr lang="en-US" dirty="0">
+                <a:solidFill>
+                  <a:schemeClr val="tx1"/>
+                </a:solidFill>
+              </a:rPr>
+              <a:t>shake</a:t>
+            </a:r>
+          </a:p>
+        </p:txBody>
+      </p:sp>
+      <p:sp>
+        <p:nvSpPr>
+          <p:cNvPr id="20" name="Rectangle 19">
+            <a:extLst>
+              <a:ext uri="{FF2B5EF4-FFF2-40B4-BE49-F238E27FC236}">
+                <a16:creationId xmlns:a16="http://schemas.microsoft.com/office/drawing/2014/main" id="{6AA78F08-818B-41B3-A67C-C3DC9E38AE77}"/>
+              </a:ext>
+            </a:extLst>
+          </p:cNvPr>
+          <p:cNvSpPr/>
+          <p:nvPr/>
+        </p:nvSpPr>
+        <p:spPr>
+          <a:xfrm>
+            <a:off x="1310613" y="1229315"/>
+            <a:ext cx="2171727" cy="273738"/>
+          </a:xfrm>
+          <a:prstGeom prst="rect">
+            <a:avLst/>
+          </a:prstGeom>
+          <a:solidFill>
+            <a:schemeClr val="accent6"/>
+          </a:solidFill>
+        </p:spPr>
+        <p:style>
+          <a:lnRef idx="2">
+            <a:schemeClr val="accent4">
+              <a:shade val="50000"/>
+            </a:schemeClr>
+          </a:lnRef>
+          <a:fillRef idx="1">
+            <a:schemeClr val="accent4"/>
+          </a:fillRef>
+          <a:effectRef idx="0">
+            <a:schemeClr val="accent4"/>
+          </a:effectRef>
+          <a:fontRef idx="minor">
+            <a:schemeClr val="lt1"/>
+          </a:fontRef>
+        </p:style>
+        <p:txBody>
+          <a:bodyPr rtlCol="0" anchor="ctr"/>
+          <a:lstStyle/>
+          <a:p>
+            <a:r>
+              <a:rPr lang="en-US" dirty="0">
+                <a:solidFill>
+                  <a:schemeClr val="tx1"/>
+                </a:solidFill>
+              </a:rPr>
+              <a:t>Move to wells  :</a:t>
+            </a:r>
+          </a:p>
+        </p:txBody>
+      </p:sp>
+      <p:sp>
+        <p:nvSpPr>
+          <p:cNvPr id="21" name="Rectangle 20">
+            <a:extLst>
+              <a:ext uri="{FF2B5EF4-FFF2-40B4-BE49-F238E27FC236}">
+                <a16:creationId xmlns:a16="http://schemas.microsoft.com/office/drawing/2014/main" id="{BA47EED5-7C08-4921-B73B-0FD06388B1CF}"/>
+              </a:ext>
+            </a:extLst>
+          </p:cNvPr>
+          <p:cNvSpPr/>
+          <p:nvPr/>
+        </p:nvSpPr>
+        <p:spPr>
+          <a:xfrm>
+            <a:off x="1310605" y="1580500"/>
+            <a:ext cx="2171727" cy="273738"/>
+          </a:xfrm>
+          <a:prstGeom prst="rect">
+            <a:avLst/>
+          </a:prstGeom>
+          <a:solidFill>
+            <a:schemeClr val="accent6"/>
+          </a:solidFill>
+        </p:spPr>
+        <p:style>
+          <a:lnRef idx="2">
+            <a:schemeClr val="accent4">
+              <a:shade val="50000"/>
+            </a:schemeClr>
+          </a:lnRef>
+          <a:fillRef idx="1">
+            <a:schemeClr val="accent4"/>
+          </a:fillRef>
+          <a:effectRef idx="0">
+            <a:schemeClr val="accent4"/>
+          </a:effectRef>
+          <a:fontRef idx="minor">
+            <a:schemeClr val="lt1"/>
+          </a:fontRef>
+        </p:style>
+        <p:txBody>
+          <a:bodyPr rtlCol="0" anchor="ctr"/>
+          <a:lstStyle/>
+          <a:p>
+            <a:r>
+              <a:rPr lang="en-US" dirty="0">
+                <a:solidFill>
+                  <a:schemeClr val="tx1"/>
+                </a:solidFill>
+              </a:rPr>
+              <a:t>Wait(s)		 :</a:t>
+            </a:r>
+          </a:p>
+        </p:txBody>
+      </p:sp>
+      <p:sp>
+        <p:nvSpPr>
+          <p:cNvPr id="22" name="Rectangle 21">
+            <a:extLst>
+              <a:ext uri="{FF2B5EF4-FFF2-40B4-BE49-F238E27FC236}">
+                <a16:creationId xmlns:a16="http://schemas.microsoft.com/office/drawing/2014/main" id="{6F49BDA9-CE52-4B0D-A6B0-20D8CABD574E}"/>
+              </a:ext>
+            </a:extLst>
+          </p:cNvPr>
+          <p:cNvSpPr/>
+          <p:nvPr/>
+        </p:nvSpPr>
+        <p:spPr>
+          <a:xfrm>
+            <a:off x="1310609" y="2612425"/>
+            <a:ext cx="2171727" cy="273738"/>
+          </a:xfrm>
+          <a:prstGeom prst="rect">
+            <a:avLst/>
+          </a:prstGeom>
+          <a:solidFill>
+            <a:schemeClr val="accent6"/>
+          </a:solidFill>
+        </p:spPr>
+        <p:style>
+          <a:lnRef idx="2">
+            <a:schemeClr val="accent4">
+              <a:shade val="50000"/>
+            </a:schemeClr>
+          </a:lnRef>
+          <a:fillRef idx="1">
+            <a:schemeClr val="accent4"/>
+          </a:fillRef>
+          <a:effectRef idx="0">
+            <a:schemeClr val="accent4"/>
+          </a:effectRef>
+          <a:fontRef idx="minor">
+            <a:schemeClr val="lt1"/>
+          </a:fontRef>
+        </p:style>
+        <p:txBody>
+          <a:bodyPr rtlCol="0" anchor="ctr"/>
+          <a:lstStyle/>
+          <a:p>
+            <a:r>
+              <a:rPr lang="en-US" dirty="0">
+                <a:solidFill>
+                  <a:schemeClr val="tx1"/>
+                </a:solidFill>
+              </a:rPr>
+              <a:t>Shake(s)		 :</a:t>
+            </a:r>
+          </a:p>
+        </p:txBody>
+      </p:sp>
+      <p:sp>
+        <p:nvSpPr>
+          <p:cNvPr id="23" name="Rectangle 22">
+            <a:extLst>
+              <a:ext uri="{FF2B5EF4-FFF2-40B4-BE49-F238E27FC236}">
+                <a16:creationId xmlns:a16="http://schemas.microsoft.com/office/drawing/2014/main" id="{E407FC82-BA91-4B1E-9C84-8AC969705D92}"/>
+              </a:ext>
+            </a:extLst>
+          </p:cNvPr>
+          <p:cNvSpPr/>
+          <p:nvPr/>
+        </p:nvSpPr>
+        <p:spPr>
+          <a:xfrm>
+            <a:off x="1310606" y="3680277"/>
+            <a:ext cx="2171727" cy="273738"/>
+          </a:xfrm>
+          <a:prstGeom prst="rect">
+            <a:avLst/>
+          </a:prstGeom>
+          <a:solidFill>
+            <a:schemeClr val="accent6"/>
+          </a:solidFill>
+        </p:spPr>
+        <p:style>
+          <a:lnRef idx="2">
+            <a:schemeClr val="accent4">
+              <a:shade val="50000"/>
+            </a:schemeClr>
+          </a:lnRef>
+          <a:fillRef idx="1">
+            <a:schemeClr val="accent4"/>
+          </a:fillRef>
+          <a:effectRef idx="0">
+            <a:schemeClr val="accent4"/>
+          </a:effectRef>
+          <a:fontRef idx="minor">
+            <a:schemeClr val="lt1"/>
+          </a:fontRef>
+        </p:style>
+        <p:txBody>
+          <a:bodyPr rtlCol="0" anchor="ctr"/>
+          <a:lstStyle/>
+          <a:p>
+            <a:r>
+              <a:rPr lang="en-US" dirty="0">
+                <a:solidFill>
+                  <a:schemeClr val="tx1"/>
+                </a:solidFill>
+              </a:rPr>
+              <a:t>Wait(s) 		 :</a:t>
+            </a:r>
+          </a:p>
+        </p:txBody>
+      </p:sp>
+      <p:sp>
+        <p:nvSpPr>
+          <p:cNvPr id="26" name="Rectangle 25">
+            <a:extLst>
+              <a:ext uri="{FF2B5EF4-FFF2-40B4-BE49-F238E27FC236}">
+                <a16:creationId xmlns:a16="http://schemas.microsoft.com/office/drawing/2014/main" id="{20E7428C-901B-4C09-BAAB-1CCA4AFA40D9}"/>
+              </a:ext>
+            </a:extLst>
+          </p:cNvPr>
+          <p:cNvSpPr/>
+          <p:nvPr/>
+        </p:nvSpPr>
+        <p:spPr>
+          <a:xfrm>
+            <a:off x="1310611" y="1920870"/>
+            <a:ext cx="2171727" cy="273738"/>
+          </a:xfrm>
+          <a:prstGeom prst="rect">
+            <a:avLst/>
+          </a:prstGeom>
+          <a:solidFill>
+            <a:schemeClr val="accent6"/>
+          </a:solidFill>
+        </p:spPr>
+        <p:style>
+          <a:lnRef idx="2">
+            <a:schemeClr val="accent4">
+              <a:shade val="50000"/>
+            </a:schemeClr>
+          </a:lnRef>
+          <a:fillRef idx="1">
+            <a:schemeClr val="accent4"/>
+          </a:fillRef>
+          <a:effectRef idx="0">
+            <a:schemeClr val="accent4"/>
+          </a:effectRef>
+          <a:fontRef idx="minor">
+            <a:schemeClr val="lt1"/>
+          </a:fontRef>
+        </p:style>
+        <p:txBody>
+          <a:bodyPr rtlCol="0" anchor="ctr"/>
+          <a:lstStyle/>
+          <a:p>
+            <a:r>
+              <a:rPr lang="en-US" dirty="0">
+                <a:solidFill>
+                  <a:schemeClr val="tx1"/>
+                </a:solidFill>
+              </a:rPr>
+              <a:t>Bottom Z 		 :</a:t>
+            </a:r>
+          </a:p>
+        </p:txBody>
+      </p:sp>
+      <p:sp>
+        <p:nvSpPr>
+          <p:cNvPr id="27" name="Rectangle 26">
+            <a:extLst>
+              <a:ext uri="{FF2B5EF4-FFF2-40B4-BE49-F238E27FC236}">
+                <a16:creationId xmlns:a16="http://schemas.microsoft.com/office/drawing/2014/main" id="{4A63AB51-C717-400D-8AA0-6A88CD02E371}"/>
+              </a:ext>
+            </a:extLst>
+          </p:cNvPr>
+          <p:cNvSpPr/>
+          <p:nvPr/>
+        </p:nvSpPr>
+        <p:spPr>
+          <a:xfrm>
+            <a:off x="1310603" y="3315021"/>
+            <a:ext cx="2171727" cy="273738"/>
+          </a:xfrm>
+          <a:prstGeom prst="rect">
+            <a:avLst/>
+          </a:prstGeom>
+          <a:solidFill>
+            <a:schemeClr val="accent6"/>
+          </a:solidFill>
+        </p:spPr>
+        <p:style>
+          <a:lnRef idx="2">
+            <a:schemeClr val="accent4">
+              <a:shade val="50000"/>
+            </a:schemeClr>
+          </a:lnRef>
+          <a:fillRef idx="1">
+            <a:schemeClr val="accent4"/>
+          </a:fillRef>
+          <a:effectRef idx="0">
+            <a:schemeClr val="accent4"/>
+          </a:effectRef>
+          <a:fontRef idx="minor">
+            <a:schemeClr val="lt1"/>
+          </a:fontRef>
+        </p:style>
+        <p:txBody>
+          <a:bodyPr rtlCol="0" anchor="ctr"/>
+          <a:lstStyle/>
+          <a:p>
+            <a:r>
+              <a:rPr lang="en-US" dirty="0">
+                <a:solidFill>
+                  <a:schemeClr val="tx1"/>
+                </a:solidFill>
+              </a:rPr>
+              <a:t>Top Z 		 :</a:t>
+            </a:r>
+          </a:p>
+        </p:txBody>
+      </p:sp>
+      <p:sp>
+        <p:nvSpPr>
+          <p:cNvPr id="28" name="Rectangle 27">
+            <a:extLst>
+              <a:ext uri="{FF2B5EF4-FFF2-40B4-BE49-F238E27FC236}">
+                <a16:creationId xmlns:a16="http://schemas.microsoft.com/office/drawing/2014/main" id="{B384FBB9-3B89-46A3-A97A-F3F597F9F9D1}"/>
+              </a:ext>
+            </a:extLst>
+          </p:cNvPr>
+          <p:cNvSpPr/>
+          <p:nvPr/>
+        </p:nvSpPr>
+        <p:spPr>
+          <a:xfrm>
+            <a:off x="1310604" y="2253690"/>
+            <a:ext cx="2171727" cy="273738"/>
+          </a:xfrm>
+          <a:prstGeom prst="rect">
+            <a:avLst/>
+          </a:prstGeom>
+          <a:solidFill>
+            <a:schemeClr val="accent6"/>
+          </a:solidFill>
+        </p:spPr>
+        <p:style>
+          <a:lnRef idx="2">
+            <a:schemeClr val="accent4">
+              <a:shade val="50000"/>
+            </a:schemeClr>
+          </a:lnRef>
+          <a:fillRef idx="1">
+            <a:schemeClr val="accent4"/>
+          </a:fillRef>
+          <a:effectRef idx="0">
+            <a:schemeClr val="accent4"/>
+          </a:effectRef>
+          <a:fontRef idx="minor">
+            <a:schemeClr val="lt1"/>
+          </a:fontRef>
+        </p:style>
+        <p:txBody>
+          <a:bodyPr rtlCol="0" anchor="ctr"/>
+          <a:lstStyle/>
+          <a:p>
+            <a:r>
+              <a:rPr lang="en-US" dirty="0">
+                <a:solidFill>
+                  <a:schemeClr val="tx1"/>
+                </a:solidFill>
+              </a:rPr>
+              <a:t>Wait(s) 		 :</a:t>
+            </a:r>
+          </a:p>
+        </p:txBody>
+      </p:sp>
+      <p:sp>
+        <p:nvSpPr>
+          <p:cNvPr id="29" name="Rectangle 28">
+            <a:extLst>
+              <a:ext uri="{FF2B5EF4-FFF2-40B4-BE49-F238E27FC236}">
+                <a16:creationId xmlns:a16="http://schemas.microsoft.com/office/drawing/2014/main" id="{104313E3-B6B8-4762-9BE8-D969E5818AC7}"/>
+              </a:ext>
+            </a:extLst>
+          </p:cNvPr>
+          <p:cNvSpPr/>
+          <p:nvPr/>
+        </p:nvSpPr>
+        <p:spPr>
+          <a:xfrm>
+            <a:off x="1310608" y="2952980"/>
+            <a:ext cx="2171727" cy="273738"/>
+          </a:xfrm>
+          <a:prstGeom prst="rect">
+            <a:avLst/>
+          </a:prstGeom>
+          <a:solidFill>
+            <a:schemeClr val="accent6"/>
+          </a:solidFill>
+        </p:spPr>
+        <p:style>
+          <a:lnRef idx="2">
+            <a:schemeClr val="accent4">
+              <a:shade val="50000"/>
+            </a:schemeClr>
+          </a:lnRef>
+          <a:fillRef idx="1">
+            <a:schemeClr val="accent4"/>
+          </a:fillRef>
+          <a:effectRef idx="0">
+            <a:schemeClr val="accent4"/>
+          </a:effectRef>
+          <a:fontRef idx="minor">
+            <a:schemeClr val="lt1"/>
+          </a:fontRef>
+        </p:style>
+        <p:txBody>
+          <a:bodyPr rtlCol="0" anchor="ctr"/>
+          <a:lstStyle/>
+          <a:p>
+            <a:r>
+              <a:rPr lang="en-US" dirty="0">
+                <a:solidFill>
+                  <a:schemeClr val="tx1"/>
+                </a:solidFill>
+              </a:rPr>
+              <a:t>Wait(s) 		 :</a:t>
+            </a:r>
+          </a:p>
+        </p:txBody>
+      </p:sp>
     </p:spTree>
     <p:extLst>
       <p:ext uri="{BB962C8B-B14F-4D97-AF65-F5344CB8AC3E}">
         <p14:creationId xmlns:p14="http://schemas.microsoft.com/office/powerpoint/2010/main" val="697925151"/>
-      </p:ext>
-    </p:extLst>
-  </p:cSld>
-  <p:clrMapOvr>
-    <a:masterClrMapping/>
-  </p:clrMapOvr>
-</p:sld>
-</file>
-
-<file path=ppt/slides/slide8.xml><?xml version="1.0" encoding="utf-8"?>
-<p:sld xmlns:a="http://schemas.openxmlformats.org/drawingml/2006/main" xmlns:r="http://schemas.openxmlformats.org/officeDocument/2006/relationships" xmlns:p="http://schemas.openxmlformats.org/presentationml/2006/main">
-  <p:cSld>
-    <p:spTree>
-      <p:nvGrpSpPr>
-        <p:cNvPr id="1" name=""/>
-        <p:cNvGrpSpPr/>
-        <p:nvPr/>
-      </p:nvGrpSpPr>
-      <p:grpSpPr>
-        <a:xfrm>
-          <a:off x="0" y="0"/>
-          <a:ext cx="0" cy="0"/>
-          <a:chOff x="0" y="0"/>
-          <a:chExt cx="0" cy="0"/>
-        </a:xfrm>
-      </p:grpSpPr>
-      <p:sp>
-        <p:nvSpPr>
-          <p:cNvPr id="2" name="Title 1">
-            <a:extLst>
-              <a:ext uri="{FF2B5EF4-FFF2-40B4-BE49-F238E27FC236}">
-                <a16:creationId xmlns:a16="http://schemas.microsoft.com/office/drawing/2014/main" id="{D65ABE23-41D0-4AD4-AEBF-8A64121931EA}"/>
-              </a:ext>
-            </a:extLst>
-          </p:cNvPr>
-          <p:cNvSpPr>
-            <a:spLocks noGrp="1"/>
-          </p:cNvSpPr>
-          <p:nvPr>
-            <p:ph type="title"/>
-          </p:nvPr>
-        </p:nvSpPr>
-        <p:spPr/>
-        <p:txBody>
-          <a:bodyPr/>
-          <a:lstStyle/>
-          <a:p>
-            <a:endParaRPr lang="en-US"/>
-          </a:p>
-        </p:txBody>
-      </p:sp>
-      <p:pic>
-        <p:nvPicPr>
-          <p:cNvPr id="9" name="Content Placeholder 8">
-            <a:extLst>
-              <a:ext uri="{FF2B5EF4-FFF2-40B4-BE49-F238E27FC236}">
-                <a16:creationId xmlns:a16="http://schemas.microsoft.com/office/drawing/2014/main" id="{B96CC200-4178-497B-82B6-719A99E8B477}"/>
-              </a:ext>
-            </a:extLst>
-          </p:cNvPr>
-          <p:cNvPicPr>
-            <a:picLocks noGrp="1" noChangeAspect="1"/>
-          </p:cNvPicPr>
-          <p:nvPr>
-            <p:ph idx="1"/>
-          </p:nvPr>
-        </p:nvPicPr>
-        <p:blipFill>
-          <a:blip r:embed="rId2"/>
-          <a:stretch>
-            <a:fillRect/>
-          </a:stretch>
-        </p:blipFill>
-        <p:spPr>
-          <a:xfrm>
-            <a:off x="1093234" y="1376092"/>
-            <a:ext cx="5433531" cy="2583404"/>
-          </a:xfrm>
-        </p:spPr>
-      </p:pic>
-    </p:spTree>
-    <p:extLst>
-      <p:ext uri="{BB962C8B-B14F-4D97-AF65-F5344CB8AC3E}">
-        <p14:creationId xmlns:p14="http://schemas.microsoft.com/office/powerpoint/2010/main" val="3524335434"/>
       </p:ext>
     </p:extLst>
   </p:cSld>

</xml_diff>